<commit_message>
prograse ppt and txt file
</commit_message>
<xml_diff>
--- a/PathFindingAndNevigationSystem.pptx
+++ b/PathFindingAndNevigationSystem.pptx
@@ -485,7 +485,7 @@
           <a:p>
             <a:fld id="{737B6BE4-D32F-4869-AD47-9E7BE89403CF}" type="datetimeFigureOut">
               <a:rPr lang="en-GB" smtClean="0"/>
-              <a:t>06/01/2024</a:t>
+              <a:t>14/04/2025</a:t>
             </a:fld>
             <a:endParaRPr lang="en-GB"/>
           </a:p>
@@ -11939,7 +11939,7 @@
         <p:fade/>
       </p:transition>
     </mc:Choice>
-    <mc:Fallback xmlns:ahyp="http://schemas.microsoft.com/office/drawing/2018/hyperlinkcolor" xmlns:p15="http://schemas.microsoft.com/office/powerpoint/2012/main" xmlns:com="http://schemas.openxmlformats.org/drawingml/2006/compatibility" xmlns:pvml="urn:schemas-microsoft-com:office:powerpoint" xmlns:v="urn:schemas-microsoft-com:vml" xmlns:o="urn:schemas-microsoft-com:office:office" xmlns:dgm="http://schemas.openxmlformats.org/drawingml/2006/diagram" xmlns:c="http://schemas.openxmlformats.org/drawingml/2006/chart" xmlns:mv="urn:schemas-microsoft-com:mac:vml" xmlns="">
+    <mc:Fallback xmlns="" xmlns:mv="urn:schemas-microsoft-com:mac:vml" xmlns:c="http://schemas.openxmlformats.org/drawingml/2006/chart" xmlns:dgm="http://schemas.openxmlformats.org/drawingml/2006/diagram" xmlns:o="urn:schemas-microsoft-com:office:office" xmlns:v="urn:schemas-microsoft-com:vml" xmlns:pvml="urn:schemas-microsoft-com:office:powerpoint" xmlns:com="http://schemas.openxmlformats.org/drawingml/2006/compatibility" xmlns:p15="http://schemas.microsoft.com/office/powerpoint/2012/main" xmlns:ahyp="http://schemas.microsoft.com/office/drawing/2018/hyperlinkcolor">
       <p:transition spd="slow">
         <p:fade/>
       </p:transition>
@@ -12088,109 +12088,6 @@
       </p:grpSpPr>
       <p:sp>
         <p:nvSpPr>
-          <p:cNvPr id="548" name="Google Shape;548;p77"/>
-          <p:cNvSpPr txBox="1">
-            <a:spLocks noGrp="1"/>
-          </p:cNvSpPr>
-          <p:nvPr>
-            <p:ph type="title"/>
-          </p:nvPr>
-        </p:nvSpPr>
-        <p:spPr>
-          <a:xfrm>
-            <a:off x="526974" y="2871127"/>
-            <a:ext cx="2758449" cy="593978"/>
-          </a:xfrm>
-          <a:prstGeom prst="rect">
-            <a:avLst/>
-          </a:prstGeom>
-        </p:spPr>
-        <p:txBody>
-          <a:bodyPr spcFirstLastPara="1" wrap="square" lIns="91425" tIns="91425" rIns="91425" bIns="91425" anchor="b" anchorCtr="0">
-            <a:noAutofit/>
-          </a:bodyPr>
-          <a:lstStyle/>
-          <a:p>
-            <a:pPr lvl="0"/>
-            <a:r>
-              <a:rPr lang="en-GB" sz="2400" dirty="0"/>
-              <a:t>Mr. </a:t>
-            </a:r>
-            <a:r>
-              <a:rPr lang="en-GB" sz="2400" dirty="0" err="1"/>
-              <a:t>Montaser</a:t>
-            </a:r>
-            <a:r>
-              <a:rPr lang="en-GB" sz="2400" dirty="0"/>
-              <a:t> Abdul </a:t>
-            </a:r>
-            <a:r>
-              <a:rPr lang="en-GB" sz="2400" dirty="0" err="1"/>
-              <a:t>Quader</a:t>
-            </a:r>
-            <a:endParaRPr lang="en-GB" sz="2400" dirty="0"/>
-          </a:p>
-        </p:txBody>
-      </p:sp>
-      <p:sp>
-        <p:nvSpPr>
-          <p:cNvPr id="549" name="Google Shape;549;p77"/>
-          <p:cNvSpPr txBox="1">
-            <a:spLocks noGrp="1"/>
-          </p:cNvSpPr>
-          <p:nvPr>
-            <p:ph type="subTitle" idx="1"/>
-          </p:nvPr>
-        </p:nvSpPr>
-        <p:spPr>
-          <a:xfrm>
-            <a:off x="526957" y="3504689"/>
-            <a:ext cx="2536084" cy="818100"/>
-          </a:xfrm>
-          <a:prstGeom prst="rect">
-            <a:avLst/>
-          </a:prstGeom>
-        </p:spPr>
-        <p:txBody>
-          <a:bodyPr spcFirstLastPara="1" wrap="square" lIns="91425" tIns="91425" rIns="91425" bIns="91425" anchor="t" anchorCtr="0">
-            <a:noAutofit/>
-          </a:bodyPr>
-          <a:lstStyle/>
-          <a:p>
-            <a:pPr marL="0" lvl="0" indent="0" algn="ctr" rtl="0">
-              <a:spcBef>
-                <a:spcPts val="0"/>
-              </a:spcBef>
-              <a:spcAft>
-                <a:spcPts val="0"/>
-              </a:spcAft>
-              <a:buNone/>
-            </a:pPr>
-            <a:r>
-              <a:rPr lang="en-GB" dirty="0"/>
-              <a:t>Lecturer, Department of CSE</a:t>
-            </a:r>
-          </a:p>
-          <a:p>
-            <a:pPr marL="0" lvl="0" indent="0" algn="ctr" rtl="0">
-              <a:spcBef>
-                <a:spcPts val="0"/>
-              </a:spcBef>
-              <a:spcAft>
-                <a:spcPts val="0"/>
-              </a:spcAft>
-              <a:buNone/>
-            </a:pPr>
-            <a:r>
-              <a:rPr lang="en-GB" dirty="0"/>
-              <a:t>Green University of Bangladesh</a:t>
-            </a:r>
-            <a:endParaRPr dirty="0"/>
-          </a:p>
-        </p:txBody>
-      </p:sp>
-      <p:sp>
-        <p:nvSpPr>
           <p:cNvPr id="17" name="Google Shape;549;p77">
             <a:extLst>
               <a:ext uri="{FF2B5EF4-FFF2-40B4-BE49-F238E27FC236}">
@@ -12489,7 +12386,7 @@
         </p:nvSpPr>
         <p:spPr>
           <a:xfrm>
-            <a:off x="5764628" y="3438202"/>
+            <a:off x="2948494" y="2282668"/>
             <a:ext cx="2536084" cy="818100"/>
           </a:xfrm>
           <a:prstGeom prst="rect">
@@ -12755,7 +12652,7 @@
             <a:pPr marL="0" indent="0"/>
             <a:r>
               <a:rPr lang="en-GB" dirty="0"/>
-              <a:t>Student ID- 221002534</a:t>
+              <a:t>Student ID- 232002280</a:t>
             </a:r>
           </a:p>
           <a:p>
@@ -13073,7 +12970,7 @@
         </p:nvSpPr>
         <p:spPr>
           <a:xfrm>
-            <a:off x="5534183" y="2910711"/>
+            <a:off x="2639772" y="1688690"/>
             <a:ext cx="3124856" cy="593978"/>
           </a:xfrm>
           <a:prstGeom prst="rect">
@@ -13338,347 +13235,7 @@
           <a:p>
             <a:r>
               <a:rPr lang="en-GB" sz="2400" dirty="0"/>
-              <a:t>Md. Mazharul Islam Shehab</a:t>
-            </a:r>
-          </a:p>
-        </p:txBody>
-      </p:sp>
-      <p:cxnSp>
-        <p:nvCxnSpPr>
-          <p:cNvPr id="29" name="Straight Connector 28">
-            <a:extLst>
-              <a:ext uri="{FF2B5EF4-FFF2-40B4-BE49-F238E27FC236}">
-                <a16:creationId xmlns:a16="http://schemas.microsoft.com/office/drawing/2014/main" id="{512E8A7E-ADE7-4D63-EC56-B4CCBB664173}"/>
-              </a:ext>
-            </a:extLst>
-          </p:cNvPr>
-          <p:cNvCxnSpPr/>
-          <p:nvPr/>
-        </p:nvCxnSpPr>
-        <p:spPr>
-          <a:xfrm>
-            <a:off x="4319822" y="768435"/>
-            <a:ext cx="0" cy="3864324"/>
-          </a:xfrm>
-          <a:prstGeom prst="line">
-            <a:avLst/>
-          </a:prstGeom>
-          <a:ln>
-            <a:headEnd type="none" w="med" len="med"/>
-            <a:tailEnd type="none" w="med" len="med"/>
-          </a:ln>
-          <a:effectLst>
-            <a:glow rad="63500">
-              <a:schemeClr val="accent2">
-                <a:satMod val="175000"/>
-                <a:alpha val="40000"/>
-              </a:schemeClr>
-            </a:glow>
-            <a:outerShdw blurRad="40000" dist="20000" dir="5400000" rotWithShape="0">
-              <a:srgbClr val="000000">
-                <a:alpha val="38000"/>
-              </a:srgbClr>
-            </a:outerShdw>
-          </a:effectLst>
-        </p:spPr>
-        <p:style>
-          <a:lnRef idx="2">
-            <a:schemeClr val="accent4"/>
-          </a:lnRef>
-          <a:fillRef idx="0">
-            <a:schemeClr val="accent4"/>
-          </a:fillRef>
-          <a:effectRef idx="1">
-            <a:schemeClr val="accent4"/>
-          </a:effectRef>
-          <a:fontRef idx="minor">
-            <a:schemeClr val="tx1"/>
-          </a:fontRef>
-        </p:style>
-      </p:cxnSp>
-      <p:sp>
-        <p:nvSpPr>
-          <p:cNvPr id="30" name="Google Shape;549;p77">
-            <a:extLst>
-              <a:ext uri="{FF2B5EF4-FFF2-40B4-BE49-F238E27FC236}">
-                <a16:creationId xmlns:a16="http://schemas.microsoft.com/office/drawing/2014/main" id="{42640A19-23B0-7FE5-5343-A206920E39DB}"/>
-              </a:ext>
-            </a:extLst>
-          </p:cNvPr>
-          <p:cNvSpPr txBox="1">
-            <a:spLocks/>
-          </p:cNvSpPr>
-          <p:nvPr/>
-        </p:nvSpPr>
-        <p:spPr>
-          <a:xfrm>
-            <a:off x="526957" y="1980550"/>
-            <a:ext cx="2536084" cy="818100"/>
-          </a:xfrm>
-          <a:prstGeom prst="rect">
-            <a:avLst/>
-          </a:prstGeom>
-          <a:noFill/>
-          <a:ln>
-            <a:noFill/>
-          </a:ln>
-        </p:spPr>
-        <p:txBody>
-          <a:bodyPr spcFirstLastPara="1" wrap="square" lIns="91425" tIns="91425" rIns="91425" bIns="91425" anchor="t" anchorCtr="0">
-            <a:noAutofit/>
-          </a:bodyPr>
-          <a:lstStyle>
-            <a:defPPr marR="0" lvl="0" algn="l" rtl="0">
-              <a:lnSpc>
-                <a:spcPct val="100000"/>
-              </a:lnSpc>
-              <a:spcBef>
-                <a:spcPts val="0"/>
-              </a:spcBef>
-              <a:spcAft>
-                <a:spcPts val="0"/>
-              </a:spcAft>
-            </a:defPPr>
-            <a:lvl1pPr marL="457200" marR="0" lvl="0" indent="-342900" algn="ctr" rtl="0">
-              <a:lnSpc>
-                <a:spcPct val="100000"/>
-              </a:lnSpc>
-              <a:spcBef>
-                <a:spcPts val="0"/>
-              </a:spcBef>
-              <a:spcAft>
-                <a:spcPts val="0"/>
-              </a:spcAft>
-              <a:buClr>
-                <a:schemeClr val="accent2"/>
-              </a:buClr>
-              <a:buSzPts val="1400"/>
-              <a:buFont typeface="Fira Sans Condensed"/>
-              <a:buNone/>
-              <a:defRPr sz="1400" b="0" i="0" u="none" strike="noStrike" cap="none">
-                <a:solidFill>
-                  <a:schemeClr val="accent2"/>
-                </a:solidFill>
-                <a:latin typeface="Fira Sans Condensed"/>
-                <a:ea typeface="Fira Sans Condensed"/>
-                <a:cs typeface="Fira Sans Condensed"/>
-                <a:sym typeface="Fira Sans Condensed"/>
-              </a:defRPr>
-            </a:lvl1pPr>
-            <a:lvl2pPr marL="914400" marR="0" lvl="1" indent="-317500" algn="ctr" rtl="0">
-              <a:lnSpc>
-                <a:spcPct val="100000"/>
-              </a:lnSpc>
-              <a:spcBef>
-                <a:spcPts val="0"/>
-              </a:spcBef>
-              <a:spcAft>
-                <a:spcPts val="0"/>
-              </a:spcAft>
-              <a:buClr>
-                <a:schemeClr val="accent2"/>
-              </a:buClr>
-              <a:buSzPts val="2100"/>
-              <a:buFont typeface="Fira Sans Condensed"/>
-              <a:buNone/>
-              <a:defRPr sz="2100" b="0" i="0" u="none" strike="noStrike" cap="none">
-                <a:solidFill>
-                  <a:schemeClr val="accent2"/>
-                </a:solidFill>
-                <a:latin typeface="Fira Sans Condensed"/>
-                <a:ea typeface="Fira Sans Condensed"/>
-                <a:cs typeface="Fira Sans Condensed"/>
-                <a:sym typeface="Fira Sans Condensed"/>
-              </a:defRPr>
-            </a:lvl2pPr>
-            <a:lvl3pPr marL="1371600" marR="0" lvl="2" indent="-317500" algn="ctr" rtl="0">
-              <a:lnSpc>
-                <a:spcPct val="100000"/>
-              </a:lnSpc>
-              <a:spcBef>
-                <a:spcPts val="0"/>
-              </a:spcBef>
-              <a:spcAft>
-                <a:spcPts val="0"/>
-              </a:spcAft>
-              <a:buClr>
-                <a:schemeClr val="accent2"/>
-              </a:buClr>
-              <a:buSzPts val="2100"/>
-              <a:buFont typeface="Fira Sans Condensed"/>
-              <a:buNone/>
-              <a:defRPr sz="2100" b="0" i="0" u="none" strike="noStrike" cap="none">
-                <a:solidFill>
-                  <a:schemeClr val="accent2"/>
-                </a:solidFill>
-                <a:latin typeface="Fira Sans Condensed"/>
-                <a:ea typeface="Fira Sans Condensed"/>
-                <a:cs typeface="Fira Sans Condensed"/>
-                <a:sym typeface="Fira Sans Condensed"/>
-              </a:defRPr>
-            </a:lvl3pPr>
-            <a:lvl4pPr marL="1828800" marR="0" lvl="3" indent="-317500" algn="ctr" rtl="0">
-              <a:lnSpc>
-                <a:spcPct val="100000"/>
-              </a:lnSpc>
-              <a:spcBef>
-                <a:spcPts val="0"/>
-              </a:spcBef>
-              <a:spcAft>
-                <a:spcPts val="0"/>
-              </a:spcAft>
-              <a:buClr>
-                <a:schemeClr val="accent2"/>
-              </a:buClr>
-              <a:buSzPts val="2100"/>
-              <a:buFont typeface="Fira Sans Condensed"/>
-              <a:buNone/>
-              <a:defRPr sz="2100" b="0" i="0" u="none" strike="noStrike" cap="none">
-                <a:solidFill>
-                  <a:schemeClr val="accent2"/>
-                </a:solidFill>
-                <a:latin typeface="Fira Sans Condensed"/>
-                <a:ea typeface="Fira Sans Condensed"/>
-                <a:cs typeface="Fira Sans Condensed"/>
-                <a:sym typeface="Fira Sans Condensed"/>
-              </a:defRPr>
-            </a:lvl4pPr>
-            <a:lvl5pPr marL="2286000" marR="0" lvl="4" indent="-317500" algn="ctr" rtl="0">
-              <a:lnSpc>
-                <a:spcPct val="100000"/>
-              </a:lnSpc>
-              <a:spcBef>
-                <a:spcPts val="0"/>
-              </a:spcBef>
-              <a:spcAft>
-                <a:spcPts val="0"/>
-              </a:spcAft>
-              <a:buClr>
-                <a:schemeClr val="accent2"/>
-              </a:buClr>
-              <a:buSzPts val="2100"/>
-              <a:buFont typeface="Fira Sans Condensed"/>
-              <a:buNone/>
-              <a:defRPr sz="2100" b="0" i="0" u="none" strike="noStrike" cap="none">
-                <a:solidFill>
-                  <a:schemeClr val="accent2"/>
-                </a:solidFill>
-                <a:latin typeface="Fira Sans Condensed"/>
-                <a:ea typeface="Fira Sans Condensed"/>
-                <a:cs typeface="Fira Sans Condensed"/>
-                <a:sym typeface="Fira Sans Condensed"/>
-              </a:defRPr>
-            </a:lvl5pPr>
-            <a:lvl6pPr marL="2743200" marR="0" lvl="5" indent="-317500" algn="ctr" rtl="0">
-              <a:lnSpc>
-                <a:spcPct val="100000"/>
-              </a:lnSpc>
-              <a:spcBef>
-                <a:spcPts val="0"/>
-              </a:spcBef>
-              <a:spcAft>
-                <a:spcPts val="0"/>
-              </a:spcAft>
-              <a:buClr>
-                <a:schemeClr val="accent2"/>
-              </a:buClr>
-              <a:buSzPts val="2100"/>
-              <a:buFont typeface="Fira Sans Condensed"/>
-              <a:buNone/>
-              <a:defRPr sz="2100" b="0" i="0" u="none" strike="noStrike" cap="none">
-                <a:solidFill>
-                  <a:schemeClr val="accent2"/>
-                </a:solidFill>
-                <a:latin typeface="Fira Sans Condensed"/>
-                <a:ea typeface="Fira Sans Condensed"/>
-                <a:cs typeface="Fira Sans Condensed"/>
-                <a:sym typeface="Fira Sans Condensed"/>
-              </a:defRPr>
-            </a:lvl6pPr>
-            <a:lvl7pPr marL="3200400" marR="0" lvl="6" indent="-317500" algn="ctr" rtl="0">
-              <a:lnSpc>
-                <a:spcPct val="100000"/>
-              </a:lnSpc>
-              <a:spcBef>
-                <a:spcPts val="0"/>
-              </a:spcBef>
-              <a:spcAft>
-                <a:spcPts val="0"/>
-              </a:spcAft>
-              <a:buClr>
-                <a:schemeClr val="accent2"/>
-              </a:buClr>
-              <a:buSzPts val="2100"/>
-              <a:buFont typeface="Fira Sans Condensed"/>
-              <a:buNone/>
-              <a:defRPr sz="2100" b="0" i="0" u="none" strike="noStrike" cap="none">
-                <a:solidFill>
-                  <a:schemeClr val="accent2"/>
-                </a:solidFill>
-                <a:latin typeface="Fira Sans Condensed"/>
-                <a:ea typeface="Fira Sans Condensed"/>
-                <a:cs typeface="Fira Sans Condensed"/>
-                <a:sym typeface="Fira Sans Condensed"/>
-              </a:defRPr>
-            </a:lvl7pPr>
-            <a:lvl8pPr marL="3657600" marR="0" lvl="7" indent="-317500" algn="ctr" rtl="0">
-              <a:lnSpc>
-                <a:spcPct val="100000"/>
-              </a:lnSpc>
-              <a:spcBef>
-                <a:spcPts val="0"/>
-              </a:spcBef>
-              <a:spcAft>
-                <a:spcPts val="0"/>
-              </a:spcAft>
-              <a:buClr>
-                <a:schemeClr val="accent2"/>
-              </a:buClr>
-              <a:buSzPts val="2100"/>
-              <a:buFont typeface="Fira Sans Condensed"/>
-              <a:buNone/>
-              <a:defRPr sz="2100" b="0" i="0" u="none" strike="noStrike" cap="none">
-                <a:solidFill>
-                  <a:schemeClr val="accent2"/>
-                </a:solidFill>
-                <a:latin typeface="Fira Sans Condensed"/>
-                <a:ea typeface="Fira Sans Condensed"/>
-                <a:cs typeface="Fira Sans Condensed"/>
-                <a:sym typeface="Fira Sans Condensed"/>
-              </a:defRPr>
-            </a:lvl8pPr>
-            <a:lvl9pPr marL="4114800" marR="0" lvl="8" indent="-317500" algn="ctr" rtl="0">
-              <a:lnSpc>
-                <a:spcPct val="100000"/>
-              </a:lnSpc>
-              <a:spcBef>
-                <a:spcPts val="0"/>
-              </a:spcBef>
-              <a:spcAft>
-                <a:spcPts val="0"/>
-              </a:spcAft>
-              <a:buClr>
-                <a:schemeClr val="accent2"/>
-              </a:buClr>
-              <a:buSzPts val="2100"/>
-              <a:buFont typeface="Fira Sans Condensed"/>
-              <a:buNone/>
-              <a:defRPr sz="2100" b="0" i="0" u="none" strike="noStrike" cap="none">
-                <a:solidFill>
-                  <a:schemeClr val="accent2"/>
-                </a:solidFill>
-                <a:latin typeface="Fira Sans Condensed"/>
-                <a:ea typeface="Fira Sans Condensed"/>
-                <a:cs typeface="Fira Sans Condensed"/>
-                <a:sym typeface="Fira Sans Condensed"/>
-              </a:defRPr>
-            </a:lvl9pPr>
-          </a:lstStyle>
-          <a:p>
-            <a:pPr marL="0" indent="0"/>
-            <a:r>
-              <a:rPr lang="en-GB" dirty="0"/>
-              <a:t>Present to: </a:t>
+              <a:t>Rukonuzzaman Topu</a:t>
             </a:r>
           </a:p>
         </p:txBody>
@@ -13699,7 +13256,7 @@
         </p:nvSpPr>
         <p:spPr>
           <a:xfrm>
-            <a:off x="5822228" y="1980550"/>
+            <a:off x="2855744" y="1385134"/>
             <a:ext cx="2536084" cy="818100"/>
           </a:xfrm>
           <a:prstGeom prst="rect">
@@ -14067,7 +13624,7 @@
         <p:fade/>
       </p:transition>
     </mc:Choice>
-    <mc:Fallback xmlns:ahyp="http://schemas.microsoft.com/office/drawing/2018/hyperlinkcolor" xmlns:p15="http://schemas.microsoft.com/office/powerpoint/2012/main" xmlns:com="http://schemas.openxmlformats.org/drawingml/2006/compatibility" xmlns:pvml="urn:schemas-microsoft-com:office:powerpoint" xmlns:v="urn:schemas-microsoft-com:vml" xmlns:o="urn:schemas-microsoft-com:office:office" xmlns:dgm="http://schemas.openxmlformats.org/drawingml/2006/diagram" xmlns:c="http://schemas.openxmlformats.org/drawingml/2006/chart" xmlns:mv="urn:schemas-microsoft-com:mac:vml" xmlns="">
+    <mc:Fallback xmlns="" xmlns:mv="urn:schemas-microsoft-com:mac:vml" xmlns:c="http://schemas.openxmlformats.org/drawingml/2006/chart" xmlns:dgm="http://schemas.openxmlformats.org/drawingml/2006/diagram" xmlns:o="urn:schemas-microsoft-com:office:office" xmlns:v="urn:schemas-microsoft-com:vml" xmlns:pvml="urn:schemas-microsoft-com:office:powerpoint" xmlns:com="http://schemas.openxmlformats.org/drawingml/2006/compatibility" xmlns:p15="http://schemas.microsoft.com/office/powerpoint/2012/main" xmlns:ahyp="http://schemas.microsoft.com/office/drawing/2018/hyperlinkcolor">
       <p:transition spd="slow">
         <p:fade/>
       </p:transition>
@@ -14719,7 +14276,7 @@
         <p:fade thruBlk="1"/>
       </p:transition>
     </mc:Choice>
-    <mc:Fallback xmlns:ahyp="http://schemas.microsoft.com/office/drawing/2018/hyperlinkcolor" xmlns:p15="http://schemas.microsoft.com/office/powerpoint/2012/main" xmlns:com="http://schemas.openxmlformats.org/drawingml/2006/compatibility" xmlns:pvml="urn:schemas-microsoft-com:office:powerpoint" xmlns:v="urn:schemas-microsoft-com:vml" xmlns:o="urn:schemas-microsoft-com:office:office" xmlns:dgm="http://schemas.openxmlformats.org/drawingml/2006/diagram" xmlns:c="http://schemas.openxmlformats.org/drawingml/2006/chart" xmlns:mv="urn:schemas-microsoft-com:mac:vml" xmlns="">
+    <mc:Fallback xmlns="" xmlns:mv="urn:schemas-microsoft-com:mac:vml" xmlns:c="http://schemas.openxmlformats.org/drawingml/2006/chart" xmlns:dgm="http://schemas.openxmlformats.org/drawingml/2006/diagram" xmlns:o="urn:schemas-microsoft-com:office:office" xmlns:v="urn:schemas-microsoft-com:vml" xmlns:pvml="urn:schemas-microsoft-com:office:powerpoint" xmlns:com="http://schemas.openxmlformats.org/drawingml/2006/compatibility" xmlns:p15="http://schemas.microsoft.com/office/powerpoint/2012/main" xmlns:ahyp="http://schemas.microsoft.com/office/drawing/2018/hyperlinkcolor">
       <p:transition spd="slow">
         <p:fade/>
       </p:transition>
@@ -15113,7 +14670,7 @@
         <p:fade thruBlk="1"/>
       </p:transition>
     </mc:Choice>
-    <mc:Fallback xmlns:ahyp="http://schemas.microsoft.com/office/drawing/2018/hyperlinkcolor" xmlns:p15="http://schemas.microsoft.com/office/powerpoint/2012/main" xmlns:com="http://schemas.openxmlformats.org/drawingml/2006/compatibility" xmlns:pvml="urn:schemas-microsoft-com:office:powerpoint" xmlns:v="urn:schemas-microsoft-com:vml" xmlns:o="urn:schemas-microsoft-com:office:office" xmlns:dgm="http://schemas.openxmlformats.org/drawingml/2006/diagram" xmlns:c="http://schemas.openxmlformats.org/drawingml/2006/chart" xmlns:mv="urn:schemas-microsoft-com:mac:vml" xmlns="">
+    <mc:Fallback xmlns="" xmlns:mv="urn:schemas-microsoft-com:mac:vml" xmlns:c="http://schemas.openxmlformats.org/drawingml/2006/chart" xmlns:dgm="http://schemas.openxmlformats.org/drawingml/2006/diagram" xmlns:o="urn:schemas-microsoft-com:office:office" xmlns:v="urn:schemas-microsoft-com:vml" xmlns:pvml="urn:schemas-microsoft-com:office:powerpoint" xmlns:com="http://schemas.openxmlformats.org/drawingml/2006/compatibility" xmlns:p15="http://schemas.microsoft.com/office/powerpoint/2012/main" xmlns:ahyp="http://schemas.microsoft.com/office/drawing/2018/hyperlinkcolor">
       <p:transition spd="slow">
         <p:fade/>
       </p:transition>
@@ -21319,7 +20876,7 @@
         <p:fade/>
       </p:transition>
     </mc:Choice>
-    <mc:Fallback xmlns:ahyp="http://schemas.microsoft.com/office/drawing/2018/hyperlinkcolor" xmlns:p15="http://schemas.microsoft.com/office/powerpoint/2012/main" xmlns:com="http://schemas.openxmlformats.org/drawingml/2006/compatibility" xmlns:pvml="urn:schemas-microsoft-com:office:powerpoint" xmlns:v="urn:schemas-microsoft-com:vml" xmlns:o="urn:schemas-microsoft-com:office:office" xmlns:dgm="http://schemas.openxmlformats.org/drawingml/2006/diagram" xmlns:c="http://schemas.openxmlformats.org/drawingml/2006/chart" xmlns:mv="urn:schemas-microsoft-com:mac:vml" xmlns="">
+    <mc:Fallback xmlns="" xmlns:mv="urn:schemas-microsoft-com:mac:vml" xmlns:c="http://schemas.openxmlformats.org/drawingml/2006/chart" xmlns:dgm="http://schemas.openxmlformats.org/drawingml/2006/diagram" xmlns:o="urn:schemas-microsoft-com:office:office" xmlns:v="urn:schemas-microsoft-com:vml" xmlns:pvml="urn:schemas-microsoft-com:office:powerpoint" xmlns:com="http://schemas.openxmlformats.org/drawingml/2006/compatibility" xmlns:p15="http://schemas.microsoft.com/office/powerpoint/2012/main" xmlns:ahyp="http://schemas.microsoft.com/office/drawing/2018/hyperlinkcolor">
       <p:transition spd="slow">
         <p:fade/>
       </p:transition>

</xml_diff>